<commit_message>
make face_eye detection part
</commit_message>
<xml_diff>
--- a/Documents/IT종합설계발표(1차).pptx
+++ b/Documents/IT종합설계발표(1차).pptx
@@ -318,7 +318,7 @@
           <a:p>
             <a:fld id="{ACF1A1B0-862D-4909-A7DB-D8ADA062DFCA}" type="datetimeFigureOut">
               <a:rPr lang="en-US" dirty="0"/>
-              <a:t>3/28/2021</a:t>
+              <a:t>3/29/2021</a:t>
             </a:fld>
             <a:endParaRPr lang="en-US" dirty="0"/>
           </a:p>
@@ -538,7 +538,7 @@
           <a:p>
             <a:fld id="{7B156144-9CB7-4E3A-B87E-A382F9BE05EF}" type="datetimeFigureOut">
               <a:rPr lang="en-US" dirty="0"/>
-              <a:t>3/28/2021</a:t>
+              <a:t>3/29/2021</a:t>
             </a:fld>
             <a:endParaRPr lang="en-US" dirty="0"/>
           </a:p>
@@ -713,7 +713,7 @@
           <a:p>
             <a:fld id="{2643D55F-46AB-4791-9172-4FA8DD3A6A9C}" type="datetimeFigureOut">
               <a:rPr lang="en-US" dirty="0"/>
-              <a:t>3/28/2021</a:t>
+              <a:t>3/29/2021</a:t>
             </a:fld>
             <a:endParaRPr lang="en-US" dirty="0"/>
           </a:p>
@@ -878,7 +878,7 @@
           <a:p>
             <a:fld id="{58026881-8A08-449C-8D73-E5F201F814C1}" type="datetimeFigureOut">
               <a:rPr lang="en-US" dirty="0"/>
-              <a:t>3/28/2021</a:t>
+              <a:t>3/29/2021</a:t>
             </a:fld>
             <a:endParaRPr lang="en-US" dirty="0"/>
           </a:p>
@@ -1164,7 +1164,7 @@
           <a:p>
             <a:fld id="{1BEB5A5E-0C07-4E93-A112-D37B4D166B30}" type="datetimeFigureOut">
               <a:rPr lang="en-US" dirty="0"/>
-              <a:t>3/28/2021</a:t>
+              <a:t>3/29/2021</a:t>
             </a:fld>
             <a:endParaRPr lang="en-US" dirty="0"/>
           </a:p>
@@ -1485,7 +1485,7 @@
           <a:p>
             <a:fld id="{9E1F71C5-DC57-4358-A1EA-30C08AF6E3C5}" type="datetimeFigureOut">
               <a:rPr lang="en-US" dirty="0"/>
-              <a:t>3/28/2021</a:t>
+              <a:t>3/29/2021</a:t>
             </a:fld>
             <a:endParaRPr lang="en-US" dirty="0"/>
           </a:p>
@@ -1892,7 +1892,7 @@
           <a:p>
             <a:fld id="{12571DBA-DE60-4731-B773-47AAA185C143}" type="datetimeFigureOut">
               <a:rPr lang="en-US" dirty="0"/>
-              <a:t>3/28/2021</a:t>
+              <a:t>3/29/2021</a:t>
             </a:fld>
             <a:endParaRPr lang="en-US" dirty="0"/>
           </a:p>
@@ -2005,7 +2005,7 @@
           <a:p>
             <a:fld id="{4F170639-886C-4FCF-9EAB-ABB5DA3F3F4A}" type="datetimeFigureOut">
               <a:rPr lang="en-US" dirty="0"/>
-              <a:t>3/28/2021</a:t>
+              <a:t>3/29/2021</a:t>
             </a:fld>
             <a:endParaRPr lang="en-US" dirty="0"/>
           </a:p>
@@ -2095,7 +2095,7 @@
           <a:p>
             <a:fld id="{34C4A628-C83B-4C66-83F4-1711CE3738FD}" type="datetimeFigureOut">
               <a:rPr lang="en-US" dirty="0"/>
-              <a:t>3/28/2021</a:t>
+              <a:t>3/29/2021</a:t>
             </a:fld>
             <a:endParaRPr lang="en-US" dirty="0"/>
           </a:p>
@@ -2377,7 +2377,7 @@
           <a:p>
             <a:fld id="{B88C1D73-9400-43CA-A37F-F9B7D00DE14C}" type="datetimeFigureOut">
               <a:rPr lang="en-US" dirty="0"/>
-              <a:t>3/28/2021</a:t>
+              <a:t>3/29/2021</a:t>
             </a:fld>
             <a:endParaRPr lang="en-US" dirty="0"/>
           </a:p>
@@ -2649,7 +2649,7 @@
           <a:p>
             <a:fld id="{188B7711-B905-4633-B4D7-6F3A49A2E7D9}" type="datetimeFigureOut">
               <a:rPr lang="en-US" dirty="0"/>
-              <a:t>3/28/2021</a:t>
+              <a:t>3/29/2021</a:t>
             </a:fld>
             <a:endParaRPr lang="en-US" dirty="0"/>
           </a:p>
@@ -2896,7 +2896,7 @@
             <a:fld id="{89C235CF-BDA2-4E7E-8BBD-350479985E74}" type="datetimeFigureOut">
               <a:rPr lang="en-US" dirty="0"/>
               <a:pPr/>
-              <a:t>3/28/2021</a:t>
+              <a:t>3/29/2021</a:t>
             </a:fld>
             <a:endParaRPr lang="en-US" dirty="0"/>
           </a:p>
@@ -3753,7 +3753,7 @@
         <p:spPr>
           <a:xfrm>
             <a:off x="1806709" y="5115405"/>
-            <a:ext cx="3895987" cy="954107"/>
+            <a:ext cx="3895987" cy="1169551"/>
           </a:xfrm>
           <a:prstGeom prst="rect">
             <a:avLst/>
@@ -3792,6 +3792,21 @@
             <a:endParaRPr lang="en-US" altLang="ko-KR" sz="1400" dirty="0"/>
           </a:p>
           <a:p>
+            <a:endParaRPr lang="en-US" altLang="ko-KR" sz="1400" dirty="0"/>
+          </a:p>
+          <a:p>
+            <a:r>
+              <a:rPr lang="ko-KR" altLang="en-US" sz="1400" dirty="0"/>
+              <a:t> 역할</a:t>
+            </a:r>
+            <a:r>
+              <a:rPr lang="en-US" altLang="ko-KR" sz="1400" dirty="0"/>
+              <a:t>: </a:t>
+            </a:r>
+            <a:r>
+              <a:rPr lang="ko-KR" altLang="en-US" sz="1400" dirty="0"/>
+              <a:t>서비스 개발</a:t>
+            </a:r>
             <a:endParaRPr lang="en-US" altLang="ko-KR" sz="1400" dirty="0"/>
           </a:p>
           <a:p>
@@ -3828,7 +3843,7 @@
         <p:spPr>
           <a:xfrm>
             <a:off x="6489306" y="5115405"/>
-            <a:ext cx="3364542" cy="954107"/>
+            <a:ext cx="3364542" cy="1169551"/>
           </a:xfrm>
           <a:prstGeom prst="rect">
             <a:avLst/>
@@ -3863,6 +3878,21 @@
             <a:endParaRPr lang="en-US" altLang="ko-KR" sz="1400" dirty="0"/>
           </a:p>
           <a:p>
+            <a:endParaRPr lang="en-US" altLang="ko-KR" sz="1400" dirty="0"/>
+          </a:p>
+          <a:p>
+            <a:r>
+              <a:rPr lang="ko-KR" altLang="en-US" sz="1400" dirty="0"/>
+              <a:t> 역할</a:t>
+            </a:r>
+            <a:r>
+              <a:rPr lang="en-US" altLang="ko-KR" sz="1400" dirty="0"/>
+              <a:t>: </a:t>
+            </a:r>
+            <a:r>
+              <a:rPr lang="ko-KR" altLang="en-US" sz="1400" dirty="0"/>
+              <a:t>서비스 개발</a:t>
+            </a:r>
             <a:endParaRPr lang="en-US" altLang="ko-KR" sz="1400" dirty="0"/>
           </a:p>
           <a:p>

</xml_diff>